<commit_message>
EM GMM 계속 작성 중...
</commit_message>
<xml_diff>
--- a/pics/2021-02-08-GMM_and_EM/pics.pptx
+++ b/pics/2021-02-08-GMM_and_EM/pics.pptx
@@ -113,7 +113,7 @@
   </p:defaultTextStyle>
   <p:extLst>
     <p:ext uri="{EFAFB233-063F-42B5-8137-9DF3F51BA10A}">
-      <p15:sldGuideLst xmlns:p15="http://schemas.microsoft.com/office/powerpoint/2012/main" xmlns="">
+      <p15:sldGuideLst xmlns="" xmlns:p15="http://schemas.microsoft.com/office/powerpoint/2012/main">
         <p15:guide id="1" orient="horz" pos="2160">
           <p15:clr>
             <a:srgbClr val="A4A3A4"/>
@@ -309,7 +309,7 @@
           <a:p>
             <a:fld id="{FB30EDBD-1C2D-4C1E-B459-B60219FAB484}" type="datetimeFigureOut">
               <a:rPr lang="ko-KR" altLang="en-US" smtClean="0"/>
-              <a:t>2021-03-08</a:t>
+              <a:t>2021-03-22</a:t>
             </a:fld>
             <a:endParaRPr lang="ko-KR" altLang="en-US"/>
           </a:p>
@@ -472,7 +472,7 @@
           <a:p>
             <a:fld id="{FB30EDBD-1C2D-4C1E-B459-B60219FAB484}" type="datetimeFigureOut">
               <a:rPr lang="ko-KR" altLang="en-US" smtClean="0"/>
-              <a:t>2021-03-08</a:t>
+              <a:t>2021-03-22</a:t>
             </a:fld>
             <a:endParaRPr lang="ko-KR" altLang="en-US"/>
           </a:p>
@@ -645,7 +645,7 @@
           <a:p>
             <a:fld id="{FB30EDBD-1C2D-4C1E-B459-B60219FAB484}" type="datetimeFigureOut">
               <a:rPr lang="ko-KR" altLang="en-US" smtClean="0"/>
-              <a:t>2021-03-08</a:t>
+              <a:t>2021-03-22</a:t>
             </a:fld>
             <a:endParaRPr lang="ko-KR" altLang="en-US"/>
           </a:p>
@@ -808,7 +808,7 @@
           <a:p>
             <a:fld id="{FB30EDBD-1C2D-4C1E-B459-B60219FAB484}" type="datetimeFigureOut">
               <a:rPr lang="ko-KR" altLang="en-US" smtClean="0"/>
-              <a:t>2021-03-08</a:t>
+              <a:t>2021-03-22</a:t>
             </a:fld>
             <a:endParaRPr lang="ko-KR" altLang="en-US"/>
           </a:p>
@@ -1048,7 +1048,7 @@
           <a:p>
             <a:fld id="{FB30EDBD-1C2D-4C1E-B459-B60219FAB484}" type="datetimeFigureOut">
               <a:rPr lang="ko-KR" altLang="en-US" smtClean="0"/>
-              <a:t>2021-03-08</a:t>
+              <a:t>2021-03-22</a:t>
             </a:fld>
             <a:endParaRPr lang="ko-KR" altLang="en-US"/>
           </a:p>
@@ -1328,7 +1328,7 @@
           <a:p>
             <a:fld id="{FB30EDBD-1C2D-4C1E-B459-B60219FAB484}" type="datetimeFigureOut">
               <a:rPr lang="ko-KR" altLang="en-US" smtClean="0"/>
-              <a:t>2021-03-08</a:t>
+              <a:t>2021-03-22</a:t>
             </a:fld>
             <a:endParaRPr lang="ko-KR" altLang="en-US"/>
           </a:p>
@@ -1742,7 +1742,7 @@
           <a:p>
             <a:fld id="{FB30EDBD-1C2D-4C1E-B459-B60219FAB484}" type="datetimeFigureOut">
               <a:rPr lang="ko-KR" altLang="en-US" smtClean="0"/>
-              <a:t>2021-03-08</a:t>
+              <a:t>2021-03-22</a:t>
             </a:fld>
             <a:endParaRPr lang="ko-KR" altLang="en-US"/>
           </a:p>
@@ -1854,7 +1854,7 @@
           <a:p>
             <a:fld id="{FB30EDBD-1C2D-4C1E-B459-B60219FAB484}" type="datetimeFigureOut">
               <a:rPr lang="ko-KR" altLang="en-US" smtClean="0"/>
-              <a:t>2021-03-08</a:t>
+              <a:t>2021-03-22</a:t>
             </a:fld>
             <a:endParaRPr lang="ko-KR" altLang="en-US"/>
           </a:p>
@@ -1944,7 +1944,7 @@
           <a:p>
             <a:fld id="{FB30EDBD-1C2D-4C1E-B459-B60219FAB484}" type="datetimeFigureOut">
               <a:rPr lang="ko-KR" altLang="en-US" smtClean="0"/>
-              <a:t>2021-03-08</a:t>
+              <a:t>2021-03-22</a:t>
             </a:fld>
             <a:endParaRPr lang="ko-KR" altLang="en-US"/>
           </a:p>
@@ -2214,7 +2214,7 @@
           <a:p>
             <a:fld id="{FB30EDBD-1C2D-4C1E-B459-B60219FAB484}" type="datetimeFigureOut">
               <a:rPr lang="ko-KR" altLang="en-US" smtClean="0"/>
-              <a:t>2021-03-08</a:t>
+              <a:t>2021-03-22</a:t>
             </a:fld>
             <a:endParaRPr lang="ko-KR" altLang="en-US"/>
           </a:p>
@@ -2461,7 +2461,7 @@
           <a:p>
             <a:fld id="{FB30EDBD-1C2D-4C1E-B459-B60219FAB484}" type="datetimeFigureOut">
               <a:rPr lang="ko-KR" altLang="en-US" smtClean="0"/>
-              <a:t>2021-03-08</a:t>
+              <a:t>2021-03-22</a:t>
             </a:fld>
             <a:endParaRPr lang="ko-KR" altLang="en-US"/>
           </a:p>
@@ -2667,7 +2667,7 @@
           <a:p>
             <a:fld id="{FB30EDBD-1C2D-4C1E-B459-B60219FAB484}" type="datetimeFigureOut">
               <a:rPr lang="ko-KR" altLang="en-US" smtClean="0"/>
-              <a:t>2021-03-08</a:t>
+              <a:t>2021-03-22</a:t>
             </a:fld>
             <a:endParaRPr lang="ko-KR" altLang="en-US"/>
           </a:p>
@@ -3039,32 +3039,66 @@
       </p:grpSpPr>
       <p:pic>
         <p:nvPicPr>
-          <p:cNvPr id="5" name="그림 4">
-            <a:extLst>
-              <a:ext uri="{FF2B5EF4-FFF2-40B4-BE49-F238E27FC236}">
-                <a16:creationId xmlns:a16="http://schemas.microsoft.com/office/drawing/2014/main" xmlns="" id="{0CA97F2B-BDBF-4435-AE1B-5A50C189BC8F}"/>
-              </a:ext>
-            </a:extLst>
-          </p:cNvPr>
+          <p:cNvPr id="1026" name="Picture 2"/>
           <p:cNvPicPr>
-            <a:picLocks noChangeAspect="1"/>
+            <a:picLocks noChangeAspect="1" noChangeArrowheads="1"/>
           </p:cNvPicPr>
           <p:nvPr/>
         </p:nvPicPr>
         <p:blipFill>
-          <a:blip r:embed="rId2"/>
+          <a:blip r:embed="rId2">
+            <a:extLst>
+              <a:ext uri="{28A0092B-C50C-407E-A947-70E740481C1C}">
+                <a14:useLocalDpi xmlns:a14="http://schemas.microsoft.com/office/drawing/2010/main" val="0"/>
+              </a:ext>
+            </a:extLst>
+          </a:blip>
+          <a:srcRect/>
           <a:stretch>
             <a:fillRect/>
           </a:stretch>
         </p:blipFill>
-        <p:spPr>
+        <p:spPr bwMode="auto">
           <a:xfrm>
-            <a:off x="1238250" y="1524000"/>
-            <a:ext cx="6667500" cy="3810000"/>
+            <a:off x="1243013" y="1528763"/>
+            <a:ext cx="6657975" cy="3800475"/>
           </a:xfrm>
           <a:prstGeom prst="rect">
             <a:avLst/>
           </a:prstGeom>
+          <a:noFill/>
+          <a:ln>
+            <a:noFill/>
+          </a:ln>
+          <a:effectLst/>
+          <a:extLst>
+            <a:ext uri="{909E8E84-426E-40DD-AFC4-6F175D3DCCD1}">
+              <a14:hiddenFill xmlns:a14="http://schemas.microsoft.com/office/drawing/2010/main">
+                <a:solidFill>
+                  <a:schemeClr val="accent1"/>
+                </a:solidFill>
+              </a14:hiddenFill>
+            </a:ext>
+            <a:ext uri="{91240B29-F687-4F45-9708-019B960494DF}">
+              <a14:hiddenLine xmlns:a14="http://schemas.microsoft.com/office/drawing/2010/main" w="9525">
+                <a:solidFill>
+                  <a:schemeClr val="tx1"/>
+                </a:solidFill>
+                <a:miter lim="800000"/>
+                <a:headEnd/>
+                <a:tailEnd/>
+              </a14:hiddenLine>
+            </a:ext>
+            <a:ext uri="{AF507438-7753-43E0-B8FC-AC1667EBCBE1}">
+              <a14:hiddenEffects xmlns:a14="http://schemas.microsoft.com/office/drawing/2010/main">
+                <a:effectLst>
+                  <a:outerShdw dist="35921" dir="2700000" algn="ctr" rotWithShape="0">
+                    <a:schemeClr val="bg2"/>
+                  </a:outerShdw>
+                </a:effectLst>
+              </a14:hiddenEffects>
+            </a:ext>
+          </a:extLst>
         </p:spPr>
       </p:pic>
     </p:spTree>
@@ -3099,32 +3133,66 @@
       </p:grpSpPr>
       <p:pic>
         <p:nvPicPr>
-          <p:cNvPr id="3" name="그림 2">
-            <a:extLst>
-              <a:ext uri="{FF2B5EF4-FFF2-40B4-BE49-F238E27FC236}">
-                <a16:creationId xmlns:a16="http://schemas.microsoft.com/office/drawing/2014/main" xmlns="" id="{6D620165-C028-409D-8E5F-301D6C7E0DD0}"/>
-              </a:ext>
-            </a:extLst>
-          </p:cNvPr>
+          <p:cNvPr id="2050" name="Picture 2"/>
           <p:cNvPicPr>
-            <a:picLocks noChangeAspect="1"/>
+            <a:picLocks noChangeAspect="1" noChangeArrowheads="1"/>
           </p:cNvPicPr>
           <p:nvPr/>
         </p:nvPicPr>
         <p:blipFill>
-          <a:blip r:embed="rId2"/>
+          <a:blip r:embed="rId2">
+            <a:extLst>
+              <a:ext uri="{28A0092B-C50C-407E-A947-70E740481C1C}">
+                <a14:useLocalDpi xmlns:a14="http://schemas.microsoft.com/office/drawing/2010/main" val="0"/>
+              </a:ext>
+            </a:extLst>
+          </a:blip>
+          <a:srcRect/>
           <a:stretch>
             <a:fillRect/>
           </a:stretch>
         </p:blipFill>
-        <p:spPr>
+        <p:spPr bwMode="auto">
           <a:xfrm>
-            <a:off x="1238250" y="1524000"/>
-            <a:ext cx="6667500" cy="3810000"/>
+            <a:off x="1243013" y="1528763"/>
+            <a:ext cx="6657975" cy="3800475"/>
           </a:xfrm>
           <a:prstGeom prst="rect">
             <a:avLst/>
           </a:prstGeom>
+          <a:noFill/>
+          <a:ln>
+            <a:noFill/>
+          </a:ln>
+          <a:effectLst/>
+          <a:extLst>
+            <a:ext uri="{909E8E84-426E-40DD-AFC4-6F175D3DCCD1}">
+              <a14:hiddenFill xmlns:a14="http://schemas.microsoft.com/office/drawing/2010/main">
+                <a:solidFill>
+                  <a:schemeClr val="accent1"/>
+                </a:solidFill>
+              </a14:hiddenFill>
+            </a:ext>
+            <a:ext uri="{91240B29-F687-4F45-9708-019B960494DF}">
+              <a14:hiddenLine xmlns:a14="http://schemas.microsoft.com/office/drawing/2010/main" w="9525">
+                <a:solidFill>
+                  <a:schemeClr val="tx1"/>
+                </a:solidFill>
+                <a:miter lim="800000"/>
+                <a:headEnd/>
+                <a:tailEnd/>
+              </a14:hiddenLine>
+            </a:ext>
+            <a:ext uri="{AF507438-7753-43E0-B8FC-AC1667EBCBE1}">
+              <a14:hiddenEffects xmlns:a14="http://schemas.microsoft.com/office/drawing/2010/main">
+                <a:effectLst>
+                  <a:outerShdw dist="35921" dir="2700000" algn="ctr" rotWithShape="0">
+                    <a:schemeClr val="bg2"/>
+                  </a:outerShdw>
+                </a:effectLst>
+              </a14:hiddenEffects>
+            </a:ext>
+          </a:extLst>
         </p:spPr>
       </p:pic>
     </p:spTree>
@@ -3162,7 +3230,7 @@
           <p:cNvPr id="5" name="그림 4">
             <a:extLst>
               <a:ext uri="{FF2B5EF4-FFF2-40B4-BE49-F238E27FC236}">
-                <a16:creationId xmlns:a16="http://schemas.microsoft.com/office/drawing/2014/main" xmlns="" id="{8165204D-AB0A-4E4A-9C9F-A170AC273F1C}"/>
+                <a16:creationId xmlns="" xmlns:a16="http://schemas.microsoft.com/office/drawing/2014/main" id="{8165204D-AB0A-4E4A-9C9F-A170AC273F1C}"/>
               </a:ext>
             </a:extLst>
           </p:cNvPr>
@@ -3219,7 +3287,7 @@
       </p:grpSpPr>
       <p:pic>
         <p:nvPicPr>
-          <p:cNvPr id="1026" name="Picture 2"/>
+          <p:cNvPr id="3074" name="Picture 2"/>
           <p:cNvPicPr>
             <a:picLocks noChangeAspect="1" noChangeArrowheads="1"/>
           </p:cNvPicPr>
@@ -3313,7 +3381,7 @@
       </p:grpSpPr>
       <p:pic>
         <p:nvPicPr>
-          <p:cNvPr id="2050" name="Picture 2"/>
+          <p:cNvPr id="4098" name="Picture 2"/>
           <p:cNvPicPr>
             <a:picLocks noChangeAspect="1" noChangeArrowheads="1"/>
           </p:cNvPicPr>
@@ -3334,7 +3402,7 @@
         </p:blipFill>
         <p:spPr bwMode="auto">
           <a:xfrm>
-            <a:off x="1191816" y="1366242"/>
+            <a:off x="1243013" y="1353468"/>
             <a:ext cx="6657975" cy="3800475"/>
           </a:xfrm>
           <a:prstGeom prst="rect">
@@ -3393,11 +3461,14 @@
             </a:avLst>
           </a:prstGeom>
           <a:solidFill>
-            <a:srgbClr val="00CCFF"/>
+            <a:srgbClr val="D95319"/>
           </a:solidFill>
           <a:ln>
             <a:solidFill>
-              <a:schemeClr val="accent1"/>
+              <a:schemeClr val="tx1">
+                <a:lumMod val="85000"/>
+                <a:lumOff val="15000"/>
+              </a:schemeClr>
             </a:solidFill>
           </a:ln>
         </p:spPr>
@@ -3426,8 +3497,8 @@
           </a:p>
         </p:txBody>
       </p:sp>
-      <mc:AlternateContent xmlns:mc="http://schemas.openxmlformats.org/markup-compatibility/2006" xmlns:a14="http://schemas.microsoft.com/office/drawing/2010/main">
-        <mc:Choice Requires="a14">
+      <mc:AlternateContent xmlns:mc="http://schemas.openxmlformats.org/markup-compatibility/2006">
+        <mc:Choice xmlns:a14="http://schemas.microsoft.com/office/drawing/2010/main" Requires="a14">
           <p:sp>
             <p:nvSpPr>
               <p:cNvPr id="5" name="TextBox 4"/>
@@ -3447,7 +3518,7 @@
               </a:solidFill>
               <a:ln w="19050">
                 <a:solidFill>
-                  <a:schemeClr val="accent2"/>
+                  <a:srgbClr val="0072BD"/>
                 </a:solidFill>
               </a:ln>
             </p:spPr>
@@ -3508,7 +3579,7 @@
             </p:txBody>
           </p:sp>
         </mc:Choice>
-        <mc:Fallback xmlns="">
+        <mc:Fallback>
           <p:sp>
             <p:nvSpPr>
               <p:cNvPr id="5" name="TextBox 4"/>
@@ -3533,7 +3604,7 @@
               </a:blipFill>
               <a:ln w="19050">
                 <a:solidFill>
-                  <a:schemeClr val="accent2"/>
+                  <a:srgbClr val="0072BD"/>
                 </a:solidFill>
               </a:ln>
             </p:spPr>
@@ -3552,8 +3623,8 @@
           </p:sp>
         </mc:Fallback>
       </mc:AlternateContent>
-      <mc:AlternateContent xmlns:mc="http://schemas.openxmlformats.org/markup-compatibility/2006" xmlns:a14="http://schemas.microsoft.com/office/drawing/2010/main">
-        <mc:Choice Requires="a14">
+      <mc:AlternateContent xmlns:mc="http://schemas.openxmlformats.org/markup-compatibility/2006">
+        <mc:Choice xmlns:a14="http://schemas.microsoft.com/office/drawing/2010/main" Requires="a14">
           <p:sp>
             <p:nvSpPr>
               <p:cNvPr id="8" name="TextBox 7"/>
@@ -3571,7 +3642,7 @@
               <a:noFill/>
               <a:ln w="28575">
                 <a:solidFill>
-                  <a:srgbClr val="0070C0"/>
+                  <a:srgbClr val="D95319"/>
                 </a:solidFill>
               </a:ln>
             </p:spPr>
@@ -3632,7 +3703,7 @@
             </p:txBody>
           </p:sp>
         </mc:Choice>
-        <mc:Fallback xmlns="">
+        <mc:Fallback>
           <p:sp>
             <p:nvSpPr>
               <p:cNvPr id="8" name="TextBox 7"/>
@@ -3657,7 +3728,7 @@
               </a:blipFill>
               <a:ln w="28575">
                 <a:solidFill>
-                  <a:srgbClr val="0070C0"/>
+                  <a:srgbClr val="D95319"/>
                 </a:solidFill>
               </a:ln>
             </p:spPr>
@@ -3694,11 +3765,14 @@
             </a:avLst>
           </a:prstGeom>
           <a:solidFill>
-            <a:srgbClr val="FF7C80"/>
+            <a:srgbClr val="0072BD"/>
           </a:solidFill>
           <a:ln w="9525">
             <a:solidFill>
-              <a:schemeClr val="accent2"/>
+              <a:schemeClr val="tx1">
+                <a:lumMod val="85000"/>
+                <a:lumOff val="15000"/>
+              </a:schemeClr>
             </a:solidFill>
           </a:ln>
         </p:spPr>
@@ -3759,7 +3833,7 @@
       </p:grpSpPr>
       <p:pic>
         <p:nvPicPr>
-          <p:cNvPr id="3074" name="Picture 2"/>
+          <p:cNvPr id="5122" name="Picture 2"/>
           <p:cNvPicPr>
             <a:picLocks noChangeAspect="1" noChangeArrowheads="1"/>
           </p:cNvPicPr>
@@ -3853,7 +3927,7 @@
       </p:grpSpPr>
       <p:pic>
         <p:nvPicPr>
-          <p:cNvPr id="1026" name="Picture 2"/>
+          <p:cNvPr id="6146" name="Picture 2"/>
           <p:cNvPicPr>
             <a:picLocks noChangeAspect="1" noChangeArrowheads="1"/>
           </p:cNvPicPr>
@@ -4237,8 +4311,8 @@
           </a:p>
         </p:txBody>
       </p:sp>
-      <mc:AlternateContent xmlns:mc="http://schemas.openxmlformats.org/markup-compatibility/2006">
-        <mc:Choice xmlns:a14="http://schemas.microsoft.com/office/drawing/2010/main" Requires="a14">
+      <mc:AlternateContent xmlns:mc="http://schemas.openxmlformats.org/markup-compatibility/2006" xmlns:a14="http://schemas.microsoft.com/office/drawing/2010/main">
+        <mc:Choice Requires="a14">
           <p:sp>
             <p:nvSpPr>
               <p:cNvPr id="13" name="TextBox 12"/>
@@ -4449,7 +4523,7 @@
             </p:txBody>
           </p:sp>
         </mc:Choice>
-        <mc:Fallback>
+        <mc:Fallback xmlns="">
           <p:sp>
             <p:nvSpPr>
               <p:cNvPr id="13" name="TextBox 12"/>

</xml_diff>